<commit_message>
Continue development of the DC plan
</commit_message>
<xml_diff>
--- a/figures/data_challenge_1.pptx
+++ b/figures/data_challenge_1.pptx
@@ -2869,7 +2869,7 @@
         </p:nvSpPr>
         <p:spPr>
           <a:xfrm>
-            <a:off x="3049708" y="1995568"/>
+            <a:off x="3049708" y="2099073"/>
             <a:ext cx="962389" cy="474615"/>
           </a:xfrm>
           <a:prstGeom prst="roundRect">
@@ -2947,6 +2947,22 @@
         </p:style>
         <p:txBody>
           <a:bodyPr rtlCol="0" anchor="ctr"/>
+          <a:p>
+            <a:pPr algn="ctr"/>
+            <a:r>
+              <a:rPr lang="en-US" sz="1600">
+                <a:solidFill>
+                  <a:srgbClr val="FF0000"/>
+                </a:solidFill>
+              </a:rPr>
+              <a:t>CERN</a:t>
+            </a:r>
+            <a:endParaRPr lang="en-US" sz="1600">
+              <a:solidFill>
+                <a:srgbClr val="FF0000"/>
+              </a:solidFill>
+            </a:endParaRPr>
+          </a:p>
           <a:p>
             <a:pPr algn="ctr"/>
             <a:r>
@@ -2976,8 +2992,8 @@
         </p:nvCxnSpPr>
         <p:spPr>
           <a:xfrm flipV="1">
-            <a:off x="3140075" y="1591310"/>
-            <a:ext cx="782320" cy="10795"/>
+            <a:off x="3140075" y="1590675"/>
+            <a:ext cx="782320" cy="11430"/>
           </a:xfrm>
           <a:prstGeom prst="straightConnector1">
             <a:avLst/>
@@ -3012,8 +3028,8 @@
         </p:nvSpPr>
         <p:spPr>
           <a:xfrm>
-            <a:off x="3922470" y="1186829"/>
-            <a:ext cx="1440393" cy="809296"/>
+            <a:off x="3922395" y="1256030"/>
+            <a:ext cx="1440180" cy="668655"/>
           </a:xfrm>
           <a:prstGeom prst="ellipse">
             <a:avLst/>
@@ -3064,8 +3080,8 @@
         </p:nvSpPr>
         <p:spPr>
           <a:xfrm>
-            <a:off x="2072640" y="2233295"/>
-            <a:ext cx="892175" cy="813435"/>
+            <a:off x="2131695" y="2407920"/>
+            <a:ext cx="833120" cy="638810"/>
           </a:xfrm>
           <a:prstGeom prst="ellipse">
             <a:avLst/>
@@ -3098,7 +3114,7 @@
                   <a:srgbClr val="7030A0"/>
                 </a:solidFill>
               </a:rPr>
-              <a:t>CASTOR</a:t>
+              <a:t>CERN</a:t>
             </a:r>
             <a:endParaRPr lang="en-US" sz="970">
               <a:solidFill>
@@ -3106,21 +3122,37 @@
               </a:solidFill>
             </a:endParaRPr>
           </a:p>
+          <a:p>
+            <a:pPr algn="ctr"/>
+            <a:r>
+              <a:rPr lang="en-US" sz="970">
+                <a:solidFill>
+                  <a:srgbClr val="7030A0"/>
+                </a:solidFill>
+              </a:rPr>
+              <a:t>CASTOR</a:t>
+            </a:r>
+            <a:endParaRPr lang="en-US" sz="970">
+              <a:solidFill>
+                <a:srgbClr val="7030A0"/>
+              </a:solidFill>
+            </a:endParaRPr>
+          </a:p>
         </p:txBody>
       </p:sp>
       <p:cxnSp>
         <p:nvCxnSpPr>
           <p:cNvPr id="25" name="Straight Arrow Connector 24"/>
           <p:cNvCxnSpPr>
-            <a:stCxn id="4" idx="3"/>
-            <a:endCxn id="2" idx="2"/>
+            <a:stCxn id="11" idx="2"/>
+            <a:endCxn id="2" idx="6"/>
           </p:cNvCxnSpPr>
           <p:nvPr/>
         </p:nvCxnSpPr>
         <p:spPr>
-          <a:xfrm>
-            <a:off x="1880870" y="2233295"/>
-            <a:ext cx="191770" cy="407035"/>
+          <a:xfrm flipH="1">
+            <a:off x="2964815" y="2573655"/>
+            <a:ext cx="566420" cy="153670"/>
           </a:xfrm>
           <a:prstGeom prst="straightConnector1">
             <a:avLst/>
@@ -3151,7 +3183,7 @@
         <p:nvCxnSpPr>
           <p:cNvPr id="26" name="Straight Arrow Connector 25"/>
           <p:cNvCxnSpPr>
-            <a:stCxn id="11" idx="1"/>
+            <a:stCxn id="11" idx="0"/>
             <a:endCxn id="14" idx="5"/>
           </p:cNvCxnSpPr>
           <p:nvPr/>
@@ -3159,7 +3191,7 @@
         <p:spPr>
           <a:xfrm flipH="1" flipV="1">
             <a:off x="2964815" y="1887855"/>
-            <a:ext cx="85090" cy="345440"/>
+            <a:ext cx="566420" cy="211455"/>
           </a:xfrm>
           <a:prstGeom prst="straightConnector1">
             <a:avLst/>
@@ -3197,8 +3229,8 @@
         </p:nvCxnSpPr>
         <p:spPr>
           <a:xfrm flipV="1">
-            <a:off x="4012565" y="1877060"/>
-            <a:ext cx="120650" cy="356235"/>
+            <a:off x="4012565" y="1826895"/>
+            <a:ext cx="120650" cy="509905"/>
           </a:xfrm>
           <a:prstGeom prst="straightConnector1">
             <a:avLst/>
@@ -3233,8 +3265,8 @@
         </p:nvSpPr>
         <p:spPr>
           <a:xfrm>
-            <a:off x="4236720" y="2233295"/>
-            <a:ext cx="892175" cy="813435"/>
+            <a:off x="4196080" y="2399030"/>
+            <a:ext cx="892175" cy="619760"/>
           </a:xfrm>
           <a:prstGeom prst="ellipse">
             <a:avLst/>
@@ -3259,6 +3291,26 @@
         </p:style>
         <p:txBody>
           <a:bodyPr rtlCol="0" anchor="ctr"/>
+          <a:p>
+            <a:pPr algn="ctr"/>
+            <a:r>
+              <a:rPr lang="en-US" sz="1000">
+                <a:solidFill>
+                  <a:schemeClr val="accent6">
+                    <a:lumMod val="75000"/>
+                  </a:schemeClr>
+                </a:solidFill>
+              </a:rPr>
+              <a:t>FNAL</a:t>
+            </a:r>
+            <a:endParaRPr lang="en-US" sz="1000">
+              <a:solidFill>
+                <a:schemeClr val="accent6">
+                  <a:lumMod val="75000"/>
+                </a:schemeClr>
+              </a:solidFill>
+            </a:endParaRPr>
+          </a:p>
           <a:p>
             <a:pPr algn="ctr"/>
             <a:r>
@@ -3292,8 +3344,8 @@
         </p:nvCxnSpPr>
         <p:spPr>
           <a:xfrm>
-            <a:off x="4012565" y="2233295"/>
-            <a:ext cx="224155" cy="407035"/>
+            <a:off x="4012565" y="2336800"/>
+            <a:ext cx="183515" cy="372110"/>
           </a:xfrm>
           <a:prstGeom prst="straightConnector1">
             <a:avLst/>
@@ -3328,8 +3380,8 @@
         </p:nvSpPr>
         <p:spPr>
           <a:xfrm>
-            <a:off x="2131060" y="212725"/>
-            <a:ext cx="833755" cy="562610"/>
+            <a:off x="1988820" y="212725"/>
+            <a:ext cx="1061720" cy="562610"/>
           </a:xfrm>
           <a:prstGeom prst="cube">
             <a:avLst/>
@@ -3362,14 +3414,14 @@
           <a:p>
             <a:pPr algn="ctr"/>
             <a:r>
-              <a:rPr lang="en-US">
+              <a:rPr lang="en-US" sz="1400">
                 <a:solidFill>
                   <a:schemeClr val="tx1"/>
                 </a:solidFill>
               </a:rPr>
-              <a:t>DQM</a:t>
-            </a:r>
-            <a:endParaRPr lang="en-US">
+              <a:t>DQM/p3s</a:t>
+            </a:r>
+            <a:endParaRPr lang="en-US" sz="1400">
               <a:solidFill>
                 <a:schemeClr val="tx1"/>
               </a:solidFill>
@@ -3385,13 +3437,13 @@
         </p:nvCxnSpPr>
         <p:spPr>
           <a:xfrm>
-            <a:off x="3498215" y="128270"/>
-            <a:ext cx="0" cy="2890520"/>
+            <a:off x="3484880" y="574675"/>
+            <a:ext cx="0" cy="1423035"/>
           </a:xfrm>
           <a:prstGeom prst="line">
             <a:avLst/>
           </a:prstGeom>
-          <a:ln w="22225">
+          <a:ln w="12700">
             <a:prstDash val="lgDash"/>
           </a:ln>
         </p:spPr>
@@ -3525,8 +3577,8 @@
         </p:nvSpPr>
         <p:spPr>
           <a:xfrm>
-            <a:off x="3811270" y="219075"/>
-            <a:ext cx="1551305" cy="562610"/>
+            <a:off x="3967480" y="64135"/>
+            <a:ext cx="1350645" cy="711200"/>
           </a:xfrm>
           <a:prstGeom prst="cube">
             <a:avLst/>
@@ -3572,6 +3624,22 @@
               </a:solidFill>
             </a:endParaRPr>
           </a:p>
+          <a:p>
+            <a:pPr algn="ctr"/>
+            <a:r>
+              <a:rPr lang="en-US" sz="800">
+                <a:solidFill>
+                  <a:schemeClr val="tx1"/>
+                </a:solidFill>
+              </a:rPr>
+              <a:t>POMS</a:t>
+            </a:r>
+            <a:endParaRPr lang="en-US" sz="800">
+              <a:solidFill>
+                <a:schemeClr val="tx1"/>
+              </a:solidFill>
+            </a:endParaRPr>
+          </a:p>
         </p:txBody>
       </p:sp>
       <p:sp>
@@ -3582,8 +3650,8 @@
         </p:nvSpPr>
         <p:spPr>
           <a:xfrm>
-            <a:off x="4518025" y="775335"/>
-            <a:ext cx="329565" cy="411480"/>
+            <a:off x="4478020" y="781685"/>
+            <a:ext cx="329565" cy="480695"/>
           </a:xfrm>
           <a:prstGeom prst="upDownArrow">
             <a:avLst/>
@@ -3702,8 +3770,8 @@
         </p:nvCxnSpPr>
         <p:spPr>
           <a:xfrm flipH="1" flipV="1">
-            <a:off x="5362575" y="429895"/>
-            <a:ext cx="276225" cy="1161415"/>
+            <a:off x="5318125" y="330835"/>
+            <a:ext cx="320675" cy="1260475"/>
           </a:xfrm>
           <a:prstGeom prst="straightConnector1">
             <a:avLst/>
@@ -3743,9 +3811,9 @@
           <p:nvPr/>
         </p:nvCxnSpPr>
         <p:spPr>
-          <a:xfrm flipH="1">
-            <a:off x="5362575" y="1591310"/>
-            <a:ext cx="276225" cy="0"/>
+          <a:xfrm flipH="1" flipV="1">
+            <a:off x="5362575" y="1590675"/>
+            <a:ext cx="276225" cy="635"/>
           </a:xfrm>
           <a:prstGeom prst="straightConnector1">
             <a:avLst/>
@@ -3786,8 +3854,8 @@
         </p:nvCxnSpPr>
         <p:spPr>
           <a:xfrm flipH="1">
-            <a:off x="5128895" y="1591310"/>
-            <a:ext cx="509905" cy="1049020"/>
+            <a:off x="5088255" y="1591310"/>
+            <a:ext cx="550545" cy="1117600"/>
           </a:xfrm>
           <a:prstGeom prst="straightConnector1">
             <a:avLst/>
@@ -3834,6 +3902,12 @@
               <a:gd name="adj2" fmla="val 19093"/>
             </a:avLst>
           </a:prstGeom>
+          <a:solidFill>
+            <a:schemeClr val="accent5">
+              <a:lumMod val="20000"/>
+              <a:lumOff val="80000"/>
+            </a:schemeClr>
+          </a:solidFill>
         </p:spPr>
         <p:style>
           <a:lnRef idx="2">
@@ -3955,6 +4029,193 @@
                 <a:lumMod val="60000"/>
                 <a:lumOff val="40000"/>
               </a:schemeClr>
+            </a:solidFill>
+            <a:tailEnd type="arrow"/>
+          </a:ln>
+        </p:spPr>
+        <p:style>
+          <a:lnRef idx="1">
+            <a:schemeClr val="accent1"/>
+          </a:lnRef>
+          <a:fillRef idx="0">
+            <a:schemeClr val="accent1"/>
+          </a:fillRef>
+          <a:effectRef idx="0">
+            <a:schemeClr val="accent1"/>
+          </a:effectRef>
+          <a:fontRef idx="minor">
+            <a:schemeClr val="tx1"/>
+          </a:fontRef>
+        </p:style>
+      </p:cxnSp>
+      <p:cxnSp>
+        <p:nvCxnSpPr>
+          <p:cNvPr id="3" name="Straight Arrow Connector 2"/>
+          <p:cNvCxnSpPr/>
+          <p:nvPr/>
+        </p:nvCxnSpPr>
+        <p:spPr>
+          <a:xfrm>
+            <a:off x="2537460" y="2006600"/>
+            <a:ext cx="6985" cy="401320"/>
+          </a:xfrm>
+          <a:prstGeom prst="straightConnector1">
+            <a:avLst/>
+          </a:prstGeom>
+          <a:ln w="57150">
+            <a:solidFill>
+              <a:srgbClr val="7030A0"/>
+            </a:solidFill>
+            <a:tailEnd type="arrow"/>
+          </a:ln>
+        </p:spPr>
+        <p:style>
+          <a:lnRef idx="1">
+            <a:schemeClr val="accent1"/>
+          </a:lnRef>
+          <a:fillRef idx="0">
+            <a:schemeClr val="accent1"/>
+          </a:fillRef>
+          <a:effectRef idx="0">
+            <a:schemeClr val="accent1"/>
+          </a:effectRef>
+          <a:fontRef idx="minor">
+            <a:schemeClr val="tx1"/>
+          </a:fontRef>
+        </p:style>
+      </p:cxnSp>
+      <p:cxnSp>
+        <p:nvCxnSpPr>
+          <p:cNvPr id="7" name="Straight Arrow Connector 6"/>
+          <p:cNvCxnSpPr>
+            <a:stCxn id="21" idx="4"/>
+            <a:endCxn id="36" idx="0"/>
+          </p:cNvCxnSpPr>
+          <p:nvPr/>
+        </p:nvCxnSpPr>
+        <p:spPr>
+          <a:xfrm>
+            <a:off x="4642485" y="1924685"/>
+            <a:ext cx="0" cy="474345"/>
+          </a:xfrm>
+          <a:prstGeom prst="straightConnector1">
+            <a:avLst/>
+          </a:prstGeom>
+          <a:ln w="57150">
+            <a:solidFill>
+              <a:srgbClr val="7030A0"/>
+            </a:solidFill>
+            <a:tailEnd type="arrow"/>
+          </a:ln>
+        </p:spPr>
+        <p:style>
+          <a:lnRef idx="1">
+            <a:schemeClr val="accent1"/>
+          </a:lnRef>
+          <a:fillRef idx="0">
+            <a:schemeClr val="accent1"/>
+          </a:fillRef>
+          <a:effectRef idx="0">
+            <a:schemeClr val="accent1"/>
+          </a:effectRef>
+          <a:fontRef idx="minor">
+            <a:schemeClr val="tx1"/>
+          </a:fontRef>
+        </p:style>
+      </p:cxnSp>
+      <p:sp>
+        <p:nvSpPr>
+          <p:cNvPr id="12" name="Rectangle 11"/>
+          <p:cNvSpPr/>
+          <p:nvPr/>
+        </p:nvSpPr>
+        <p:spPr>
+          <a:xfrm>
+            <a:off x="846455" y="681990"/>
+            <a:ext cx="1009015" cy="410210"/>
+          </a:xfrm>
+          <a:prstGeom prst="rect">
+            <a:avLst/>
+          </a:prstGeom>
+          <a:solidFill>
+            <a:schemeClr val="accent2">
+              <a:lumMod val="20000"/>
+              <a:lumOff val="80000"/>
+            </a:schemeClr>
+          </a:solidFill>
+        </p:spPr>
+        <p:style>
+          <a:lnRef idx="2">
+            <a:schemeClr val="accent1">
+              <a:shade val="50000"/>
+            </a:schemeClr>
+          </a:lnRef>
+          <a:fillRef idx="1">
+            <a:schemeClr val="accent1"/>
+          </a:fillRef>
+          <a:effectRef idx="0">
+            <a:schemeClr val="accent1"/>
+          </a:effectRef>
+          <a:fontRef idx="minor">
+            <a:schemeClr val="lt1"/>
+          </a:fontRef>
+        </p:style>
+        <p:txBody>
+          <a:bodyPr rtlCol="0" anchor="ctr"/>
+          <a:p>
+            <a:pPr algn="ctr"/>
+            <a:r>
+              <a:rPr lang="en-US" sz="900">
+                <a:solidFill>
+                  <a:schemeClr val="tx1"/>
+                </a:solidFill>
+              </a:rPr>
+              <a:t>Beam</a:t>
+            </a:r>
+            <a:endParaRPr lang="en-US" sz="900">
+              <a:solidFill>
+                <a:schemeClr val="tx1"/>
+              </a:solidFill>
+            </a:endParaRPr>
+          </a:p>
+          <a:p>
+            <a:pPr algn="ctr"/>
+            <a:r>
+              <a:rPr lang="en-US" sz="900">
+                <a:solidFill>
+                  <a:schemeClr val="tx1"/>
+                </a:solidFill>
+              </a:rPr>
+              <a:t>Instrumentation</a:t>
+            </a:r>
+            <a:endParaRPr lang="en-US" sz="900">
+              <a:solidFill>
+                <a:schemeClr val="tx1"/>
+              </a:solidFill>
+            </a:endParaRPr>
+          </a:p>
+        </p:txBody>
+      </p:sp>
+      <p:cxnSp>
+        <p:nvCxnSpPr>
+          <p:cNvPr id="13" name="Straight Arrow Connector 12"/>
+          <p:cNvCxnSpPr>
+            <a:stCxn id="12" idx="3"/>
+            <a:endCxn id="14" idx="1"/>
+          </p:cNvCxnSpPr>
+          <p:nvPr/>
+        </p:nvCxnSpPr>
+        <p:spPr>
+          <a:xfrm>
+            <a:off x="1855470" y="887095"/>
+            <a:ext cx="261620" cy="429260"/>
+          </a:xfrm>
+          <a:prstGeom prst="straightConnector1">
+            <a:avLst/>
+          </a:prstGeom>
+          <a:ln w="19050">
+            <a:solidFill>
+              <a:schemeClr val="accent2"/>
             </a:solidFill>
             <a:tailEnd type="arrow"/>
           </a:ln>

</xml_diff>